<commit_message>
Replaced Shiva's files and changes images for pink borders
</commit_message>
<xml_diff>
--- a/RA-L/pictures/pdf/5diagramsplots2.pptx
+++ b/RA-L/pictures/pdf/5diagramsplots2.pptx
@@ -109,7 +109,7 @@
   </p:defaultTextStyle>
   <p:extLst>
     <p:ext uri="{EFAFB233-063F-42B5-8137-9DF3F51BA10A}">
-      <p15:sldGuideLst xmlns="" xmlns:p15="http://schemas.microsoft.com/office/powerpoint/2012/main">
+      <p15:sldGuideLst xmlns:p15="http://schemas.microsoft.com/office/powerpoint/2012/main" xmlns="">
         <p15:guide id="1" orient="horz" pos="2160">
           <p15:clr>
             <a:srgbClr val="A4A3A4"/>
@@ -208,7 +208,7 @@
           <a:p>
             <a:fld id="{1102A40C-9752-495E-9814-EDB0A74B5D72}" type="datetimeFigureOut">
               <a:rPr lang="en-US" smtClean="0"/>
-              <a:t>8/31/16</a:t>
+              <a:t>9/2/16</a:t>
             </a:fld>
             <a:endParaRPr lang="en-US"/>
           </a:p>
@@ -700,7 +700,7 @@
           <a:p>
             <a:fld id="{3C9584D4-1EC3-4110-8184-CD57BE378914}" type="datetimeFigureOut">
               <a:rPr lang="en-US" smtClean="0"/>
-              <a:t>8/31/16</a:t>
+              <a:t>9/2/16</a:t>
             </a:fld>
             <a:endParaRPr lang="en-US"/>
           </a:p>
@@ -870,7 +870,7 @@
           <a:p>
             <a:fld id="{3C9584D4-1EC3-4110-8184-CD57BE378914}" type="datetimeFigureOut">
               <a:rPr lang="en-US" smtClean="0"/>
-              <a:t>8/31/16</a:t>
+              <a:t>9/2/16</a:t>
             </a:fld>
             <a:endParaRPr lang="en-US"/>
           </a:p>
@@ -1050,7 +1050,7 @@
           <a:p>
             <a:fld id="{3C9584D4-1EC3-4110-8184-CD57BE378914}" type="datetimeFigureOut">
               <a:rPr lang="en-US" smtClean="0"/>
-              <a:t>8/31/16</a:t>
+              <a:t>9/2/16</a:t>
             </a:fld>
             <a:endParaRPr lang="en-US"/>
           </a:p>
@@ -1220,7 +1220,7 @@
           <a:p>
             <a:fld id="{3C9584D4-1EC3-4110-8184-CD57BE378914}" type="datetimeFigureOut">
               <a:rPr lang="en-US" smtClean="0"/>
-              <a:t>8/31/16</a:t>
+              <a:t>9/2/16</a:t>
             </a:fld>
             <a:endParaRPr lang="en-US"/>
           </a:p>
@@ -1466,7 +1466,7 @@
           <a:p>
             <a:fld id="{3C9584D4-1EC3-4110-8184-CD57BE378914}" type="datetimeFigureOut">
               <a:rPr lang="en-US" smtClean="0"/>
-              <a:t>8/31/16</a:t>
+              <a:t>9/2/16</a:t>
             </a:fld>
             <a:endParaRPr lang="en-US"/>
           </a:p>
@@ -1698,7 +1698,7 @@
           <a:p>
             <a:fld id="{3C9584D4-1EC3-4110-8184-CD57BE378914}" type="datetimeFigureOut">
               <a:rPr lang="en-US" smtClean="0"/>
-              <a:t>8/31/16</a:t>
+              <a:t>9/2/16</a:t>
             </a:fld>
             <a:endParaRPr lang="en-US"/>
           </a:p>
@@ -2065,7 +2065,7 @@
           <a:p>
             <a:fld id="{3C9584D4-1EC3-4110-8184-CD57BE378914}" type="datetimeFigureOut">
               <a:rPr lang="en-US" smtClean="0"/>
-              <a:t>8/31/16</a:t>
+              <a:t>9/2/16</a:t>
             </a:fld>
             <a:endParaRPr lang="en-US"/>
           </a:p>
@@ -2183,7 +2183,7 @@
           <a:p>
             <a:fld id="{3C9584D4-1EC3-4110-8184-CD57BE378914}" type="datetimeFigureOut">
               <a:rPr lang="en-US" smtClean="0"/>
-              <a:t>8/31/16</a:t>
+              <a:t>9/2/16</a:t>
             </a:fld>
             <a:endParaRPr lang="en-US"/>
           </a:p>
@@ -2278,7 +2278,7 @@
           <a:p>
             <a:fld id="{3C9584D4-1EC3-4110-8184-CD57BE378914}" type="datetimeFigureOut">
               <a:rPr lang="en-US" smtClean="0"/>
-              <a:t>8/31/16</a:t>
+              <a:t>9/2/16</a:t>
             </a:fld>
             <a:endParaRPr lang="en-US"/>
           </a:p>
@@ -2555,7 +2555,7 @@
           <a:p>
             <a:fld id="{3C9584D4-1EC3-4110-8184-CD57BE378914}" type="datetimeFigureOut">
               <a:rPr lang="en-US" smtClean="0"/>
-              <a:t>8/31/16</a:t>
+              <a:t>9/2/16</a:t>
             </a:fld>
             <a:endParaRPr lang="en-US"/>
           </a:p>
@@ -2808,7 +2808,7 @@
           <a:p>
             <a:fld id="{3C9584D4-1EC3-4110-8184-CD57BE378914}" type="datetimeFigureOut">
               <a:rPr lang="en-US" smtClean="0"/>
-              <a:t>8/31/16</a:t>
+              <a:t>9/2/16</a:t>
             </a:fld>
             <a:endParaRPr lang="en-US"/>
           </a:p>
@@ -3021,7 +3021,7 @@
           <a:p>
             <a:fld id="{3C9584D4-1EC3-4110-8184-CD57BE378914}" type="datetimeFigureOut">
               <a:rPr lang="en-US" smtClean="0"/>
-              <a:t>8/31/16</a:t>
+              <a:t>9/2/16</a:t>
             </a:fld>
             <a:endParaRPr lang="en-US"/>
           </a:p>
@@ -3559,7 +3559,7 @@
         </p:nvSpPr>
         <p:spPr>
           <a:xfrm rot="5400000">
-            <a:off x="4845187" y="6249108"/>
+            <a:off x="4845187" y="6254251"/>
             <a:ext cx="222009" cy="187034"/>
           </a:xfrm>
           <a:prstGeom prst="triangle">
@@ -3608,7 +3608,7 @@
         </p:nvSpPr>
         <p:spPr>
           <a:xfrm>
-            <a:off x="3082474" y="6329098"/>
+            <a:off x="3082474" y="6285503"/>
             <a:ext cx="130990" cy="124530"/>
           </a:xfrm>
           <a:prstGeom prst="ellipse">
@@ -3657,7 +3657,7 @@
         </p:nvSpPr>
         <p:spPr>
           <a:xfrm>
-            <a:off x="1784593" y="6315738"/>
+            <a:off x="1784593" y="6270356"/>
             <a:ext cx="125243" cy="154825"/>
           </a:xfrm>
           <a:prstGeom prst="diamond">
@@ -3876,7 +3876,7 @@
         </p:nvSpPr>
         <p:spPr>
           <a:xfrm>
-            <a:off x="9204091" y="6261916"/>
+            <a:off x="9204091" y="6251912"/>
             <a:ext cx="187036" cy="191713"/>
           </a:xfrm>
           <a:prstGeom prst="triangle">
@@ -3919,7 +3919,7 @@
         </p:nvSpPr>
         <p:spPr>
           <a:xfrm rot="10800000">
-            <a:off x="7562518" y="6278848"/>
+            <a:off x="7562518" y="6251911"/>
             <a:ext cx="215683" cy="191713"/>
           </a:xfrm>
           <a:prstGeom prst="triangle">
@@ -3962,7 +3962,7 @@
         </p:nvSpPr>
         <p:spPr>
           <a:xfrm>
-            <a:off x="1964267" y="6133869"/>
+            <a:off x="1964267" y="6116936"/>
             <a:ext cx="1083733" cy="461665"/>
           </a:xfrm>
           <a:prstGeom prst="rect">
@@ -3998,7 +3998,7 @@
         </p:nvSpPr>
         <p:spPr>
           <a:xfrm>
-            <a:off x="3318937" y="6133869"/>
+            <a:off x="3318937" y="6116936"/>
             <a:ext cx="1083733" cy="461665"/>
           </a:xfrm>
           <a:prstGeom prst="rect">
@@ -4118,7 +4118,7 @@
         </p:nvSpPr>
         <p:spPr>
           <a:xfrm>
-            <a:off x="9364143" y="6100003"/>
+            <a:off x="9364143" y="6116936"/>
             <a:ext cx="1083733" cy="461665"/>
           </a:xfrm>
           <a:prstGeom prst="rect">
@@ -4142,6 +4142,261 @@
             <a:endParaRPr lang="en-US" sz="2400" dirty="0">
               <a:latin typeface="Times"/>
               <a:cs typeface="Times"/>
+            </a:endParaRPr>
+          </a:p>
+        </p:txBody>
+      </p:sp>
+      <p:sp>
+        <p:nvSpPr>
+          <p:cNvPr id="35" name="Frame 34"/>
+          <p:cNvSpPr/>
+          <p:nvPr/>
+        </p:nvSpPr>
+        <p:spPr>
+          <a:xfrm>
+            <a:off x="1841508" y="4756154"/>
+            <a:ext cx="939800" cy="1419225"/>
+          </a:xfrm>
+          <a:prstGeom prst="frame">
+            <a:avLst>
+              <a:gd name="adj1" fmla="val 11752"/>
+            </a:avLst>
+          </a:prstGeom>
+          <a:solidFill>
+            <a:srgbClr val="FC028B"/>
+          </a:solidFill>
+          <a:ln>
+            <a:noFill/>
+          </a:ln>
+          <a:effectLst/>
+        </p:spPr>
+        <p:style>
+          <a:lnRef idx="1">
+            <a:schemeClr val="accent1"/>
+          </a:lnRef>
+          <a:fillRef idx="3">
+            <a:schemeClr val="accent1"/>
+          </a:fillRef>
+          <a:effectRef idx="2">
+            <a:schemeClr val="accent1"/>
+          </a:effectRef>
+          <a:fontRef idx="minor">
+            <a:schemeClr val="lt1"/>
+          </a:fontRef>
+        </p:style>
+        <p:txBody>
+          <a:bodyPr rtlCol="0" anchor="ctr"/>
+          <a:lstStyle/>
+          <a:p>
+            <a:pPr algn="ctr"/>
+            <a:endParaRPr lang="en-US">
+              <a:solidFill>
+                <a:schemeClr val="tx1"/>
+              </a:solidFill>
+            </a:endParaRPr>
+          </a:p>
+        </p:txBody>
+      </p:sp>
+      <p:sp>
+        <p:nvSpPr>
+          <p:cNvPr id="36" name="Frame 35"/>
+          <p:cNvSpPr/>
+          <p:nvPr/>
+        </p:nvSpPr>
+        <p:spPr>
+          <a:xfrm>
+            <a:off x="3073407" y="4743455"/>
+            <a:ext cx="1146175" cy="1438274"/>
+          </a:xfrm>
+          <a:prstGeom prst="frame">
+            <a:avLst>
+              <a:gd name="adj1" fmla="val 5272"/>
+            </a:avLst>
+          </a:prstGeom>
+          <a:solidFill>
+            <a:srgbClr val="FC028B"/>
+          </a:solidFill>
+          <a:ln>
+            <a:noFill/>
+          </a:ln>
+          <a:effectLst/>
+        </p:spPr>
+        <p:style>
+          <a:lnRef idx="1">
+            <a:schemeClr val="accent1"/>
+          </a:lnRef>
+          <a:fillRef idx="3">
+            <a:schemeClr val="accent1"/>
+          </a:fillRef>
+          <a:effectRef idx="2">
+            <a:schemeClr val="accent1"/>
+          </a:effectRef>
+          <a:fontRef idx="minor">
+            <a:schemeClr val="lt1"/>
+          </a:fontRef>
+        </p:style>
+        <p:txBody>
+          <a:bodyPr rtlCol="0" anchor="ctr"/>
+          <a:lstStyle/>
+          <a:p>
+            <a:pPr algn="ctr"/>
+            <a:endParaRPr lang="en-US">
+              <a:solidFill>
+                <a:schemeClr val="tx1"/>
+              </a:solidFill>
+            </a:endParaRPr>
+          </a:p>
+        </p:txBody>
+      </p:sp>
+      <p:sp>
+        <p:nvSpPr>
+          <p:cNvPr id="37" name="Frame 36"/>
+          <p:cNvSpPr/>
+          <p:nvPr/>
+        </p:nvSpPr>
+        <p:spPr>
+          <a:xfrm>
+            <a:off x="4527557" y="4749805"/>
+            <a:ext cx="2705093" cy="1435095"/>
+          </a:xfrm>
+          <a:prstGeom prst="frame">
+            <a:avLst>
+              <a:gd name="adj1" fmla="val 5272"/>
+            </a:avLst>
+          </a:prstGeom>
+          <a:solidFill>
+            <a:srgbClr val="FC028B"/>
+          </a:solidFill>
+          <a:ln>
+            <a:noFill/>
+          </a:ln>
+          <a:effectLst/>
+        </p:spPr>
+        <p:style>
+          <a:lnRef idx="1">
+            <a:schemeClr val="accent1"/>
+          </a:lnRef>
+          <a:fillRef idx="3">
+            <a:schemeClr val="accent1"/>
+          </a:fillRef>
+          <a:effectRef idx="2">
+            <a:schemeClr val="accent1"/>
+          </a:effectRef>
+          <a:fontRef idx="minor">
+            <a:schemeClr val="lt1"/>
+          </a:fontRef>
+        </p:style>
+        <p:txBody>
+          <a:bodyPr rtlCol="0" anchor="ctr"/>
+          <a:lstStyle/>
+          <a:p>
+            <a:pPr algn="ctr"/>
+            <a:endParaRPr lang="en-US">
+              <a:solidFill>
+                <a:schemeClr val="tx1"/>
+              </a:solidFill>
+            </a:endParaRPr>
+          </a:p>
+        </p:txBody>
+      </p:sp>
+      <p:sp>
+        <p:nvSpPr>
+          <p:cNvPr id="38" name="Frame 37"/>
+          <p:cNvSpPr/>
+          <p:nvPr/>
+        </p:nvSpPr>
+        <p:spPr>
+          <a:xfrm>
+            <a:off x="7531107" y="4787905"/>
+            <a:ext cx="1457318" cy="1352545"/>
+          </a:xfrm>
+          <a:prstGeom prst="frame">
+            <a:avLst>
+              <a:gd name="adj1" fmla="val 1970"/>
+            </a:avLst>
+          </a:prstGeom>
+          <a:solidFill>
+            <a:srgbClr val="FC028B"/>
+          </a:solidFill>
+          <a:ln>
+            <a:noFill/>
+          </a:ln>
+          <a:effectLst/>
+        </p:spPr>
+        <p:style>
+          <a:lnRef idx="1">
+            <a:schemeClr val="accent1"/>
+          </a:lnRef>
+          <a:fillRef idx="3">
+            <a:schemeClr val="accent1"/>
+          </a:fillRef>
+          <a:effectRef idx="2">
+            <a:schemeClr val="accent1"/>
+          </a:effectRef>
+          <a:fontRef idx="minor">
+            <a:schemeClr val="lt1"/>
+          </a:fontRef>
+        </p:style>
+        <p:txBody>
+          <a:bodyPr rtlCol="0" anchor="ctr"/>
+          <a:lstStyle/>
+          <a:p>
+            <a:pPr algn="ctr"/>
+            <a:endParaRPr lang="en-US">
+              <a:solidFill>
+                <a:schemeClr val="tx1"/>
+              </a:solidFill>
+            </a:endParaRPr>
+          </a:p>
+        </p:txBody>
+      </p:sp>
+      <p:sp>
+        <p:nvSpPr>
+          <p:cNvPr id="39" name="Frame 38"/>
+          <p:cNvSpPr/>
+          <p:nvPr/>
+        </p:nvSpPr>
+        <p:spPr>
+          <a:xfrm>
+            <a:off x="9290057" y="4759329"/>
+            <a:ext cx="1076318" cy="1416045"/>
+          </a:xfrm>
+          <a:prstGeom prst="frame">
+            <a:avLst>
+              <a:gd name="adj1" fmla="val 1970"/>
+            </a:avLst>
+          </a:prstGeom>
+          <a:solidFill>
+            <a:srgbClr val="FC028B"/>
+          </a:solidFill>
+          <a:ln>
+            <a:noFill/>
+          </a:ln>
+          <a:effectLst/>
+        </p:spPr>
+        <p:style>
+          <a:lnRef idx="1">
+            <a:schemeClr val="accent1"/>
+          </a:lnRef>
+          <a:fillRef idx="3">
+            <a:schemeClr val="accent1"/>
+          </a:fillRef>
+          <a:effectRef idx="2">
+            <a:schemeClr val="accent1"/>
+          </a:effectRef>
+          <a:fontRef idx="minor">
+            <a:schemeClr val="lt1"/>
+          </a:fontRef>
+        </p:style>
+        <p:txBody>
+          <a:bodyPr rtlCol="0" anchor="ctr"/>
+          <a:lstStyle/>
+          <a:p>
+            <a:pPr algn="ctr"/>
+            <a:endParaRPr lang="en-US">
+              <a:solidFill>
+                <a:schemeClr val="tx1"/>
+              </a:solidFill>
             </a:endParaRPr>
           </a:p>
         </p:txBody>
@@ -4421,7 +4676,7 @@
   <a:extraClrSchemeLst/>
   <a:extLst>
     <a:ext uri="{05A4C25C-085E-4340-85A3-A5531E510DB2}">
-      <thm15:themeFamily xmlns="" xmlns:thm15="http://schemas.microsoft.com/office/thememl/2012/main" name="Office Theme" id="{62F939B6-93AF-4DB8-9C6B-D6C7DFDC589F}" vid="{4A3C46E8-61CC-4603-A589-7422A47A8E4A}"/>
+      <thm15:themeFamily xmlns:thm15="http://schemas.microsoft.com/office/thememl/2012/main" xmlns="" name="Office Theme" id="{62F939B6-93AF-4DB8-9C6B-D6C7DFDC589F}" vid="{4A3C46E8-61CC-4603-A589-7422A47A8E4A}"/>
     </a:ext>
   </a:extLst>
 </a:theme>
@@ -4682,7 +4937,7 @@
   <a:extraClrSchemeLst/>
   <a:extLst>
     <a:ext uri="{05A4C25C-085E-4340-85A3-A5531E510DB2}">
-      <thm15:themeFamily xmlns="" xmlns:thm15="http://schemas.microsoft.com/office/thememl/2012/main" name="Office Theme" id="{62F939B6-93AF-4DB8-9C6B-D6C7DFDC589F}" vid="{4A3C46E8-61CC-4603-A589-7422A47A8E4A}"/>
+      <thm15:themeFamily xmlns:thm15="http://schemas.microsoft.com/office/thememl/2012/main" xmlns="" name="Office Theme" id="{62F939B6-93AF-4DB8-9C6B-D6C7DFDC589F}" vid="{4A3C46E8-61CC-4603-A589-7422A47A8E4A}"/>
     </a:ext>
   </a:extLst>
 </a:theme>

</xml_diff>

<commit_message>
minor typography on images
</commit_message>
<xml_diff>
--- a/RA-L/pictures/pdf/5diagramsplots2.pptx
+++ b/RA-L/pictures/pdf/5diagramsplots2.pptx
@@ -109,7 +109,7 @@
   </p:defaultTextStyle>
   <p:extLst>
     <p:ext uri="{EFAFB233-063F-42B5-8137-9DF3F51BA10A}">
-      <p15:sldGuideLst xmlns="" xmlns:p15="http://schemas.microsoft.com/office/powerpoint/2012/main">
+      <p15:sldGuideLst xmlns:p15="http://schemas.microsoft.com/office/powerpoint/2012/main" xmlns="">
         <p15:guide id="1" orient="horz" pos="2160">
           <p15:clr>
             <a:srgbClr val="A4A3A4"/>
@@ -208,7 +208,7 @@
           <a:p>
             <a:fld id="{1102A40C-9752-495E-9814-EDB0A74B5D72}" type="datetimeFigureOut">
               <a:rPr lang="en-US" smtClean="0"/>
-              <a:t>9/6/16</a:t>
+              <a:t>12/7/16</a:t>
             </a:fld>
             <a:endParaRPr lang="en-US"/>
           </a:p>
@@ -700,7 +700,7 @@
           <a:p>
             <a:fld id="{3C9584D4-1EC3-4110-8184-CD57BE378914}" type="datetimeFigureOut">
               <a:rPr lang="en-US" smtClean="0"/>
-              <a:t>9/6/16</a:t>
+              <a:t>12/7/16</a:t>
             </a:fld>
             <a:endParaRPr lang="en-US"/>
           </a:p>
@@ -870,7 +870,7 @@
           <a:p>
             <a:fld id="{3C9584D4-1EC3-4110-8184-CD57BE378914}" type="datetimeFigureOut">
               <a:rPr lang="en-US" smtClean="0"/>
-              <a:t>9/6/16</a:t>
+              <a:t>12/7/16</a:t>
             </a:fld>
             <a:endParaRPr lang="en-US"/>
           </a:p>
@@ -1050,7 +1050,7 @@
           <a:p>
             <a:fld id="{3C9584D4-1EC3-4110-8184-CD57BE378914}" type="datetimeFigureOut">
               <a:rPr lang="en-US" smtClean="0"/>
-              <a:t>9/6/16</a:t>
+              <a:t>12/7/16</a:t>
             </a:fld>
             <a:endParaRPr lang="en-US"/>
           </a:p>
@@ -1220,7 +1220,7 @@
           <a:p>
             <a:fld id="{3C9584D4-1EC3-4110-8184-CD57BE378914}" type="datetimeFigureOut">
               <a:rPr lang="en-US" smtClean="0"/>
-              <a:t>9/6/16</a:t>
+              <a:t>12/7/16</a:t>
             </a:fld>
             <a:endParaRPr lang="en-US"/>
           </a:p>
@@ -1466,7 +1466,7 @@
           <a:p>
             <a:fld id="{3C9584D4-1EC3-4110-8184-CD57BE378914}" type="datetimeFigureOut">
               <a:rPr lang="en-US" smtClean="0"/>
-              <a:t>9/6/16</a:t>
+              <a:t>12/7/16</a:t>
             </a:fld>
             <a:endParaRPr lang="en-US"/>
           </a:p>
@@ -1698,7 +1698,7 @@
           <a:p>
             <a:fld id="{3C9584D4-1EC3-4110-8184-CD57BE378914}" type="datetimeFigureOut">
               <a:rPr lang="en-US" smtClean="0"/>
-              <a:t>9/6/16</a:t>
+              <a:t>12/7/16</a:t>
             </a:fld>
             <a:endParaRPr lang="en-US"/>
           </a:p>
@@ -2065,7 +2065,7 @@
           <a:p>
             <a:fld id="{3C9584D4-1EC3-4110-8184-CD57BE378914}" type="datetimeFigureOut">
               <a:rPr lang="en-US" smtClean="0"/>
-              <a:t>9/6/16</a:t>
+              <a:t>12/7/16</a:t>
             </a:fld>
             <a:endParaRPr lang="en-US"/>
           </a:p>
@@ -2183,7 +2183,7 @@
           <a:p>
             <a:fld id="{3C9584D4-1EC3-4110-8184-CD57BE378914}" type="datetimeFigureOut">
               <a:rPr lang="en-US" smtClean="0"/>
-              <a:t>9/6/16</a:t>
+              <a:t>12/7/16</a:t>
             </a:fld>
             <a:endParaRPr lang="en-US"/>
           </a:p>
@@ -2278,7 +2278,7 @@
           <a:p>
             <a:fld id="{3C9584D4-1EC3-4110-8184-CD57BE378914}" type="datetimeFigureOut">
               <a:rPr lang="en-US" smtClean="0"/>
-              <a:t>9/6/16</a:t>
+              <a:t>12/7/16</a:t>
             </a:fld>
             <a:endParaRPr lang="en-US"/>
           </a:p>
@@ -2555,7 +2555,7 @@
           <a:p>
             <a:fld id="{3C9584D4-1EC3-4110-8184-CD57BE378914}" type="datetimeFigureOut">
               <a:rPr lang="en-US" smtClean="0"/>
-              <a:t>9/6/16</a:t>
+              <a:t>12/7/16</a:t>
             </a:fld>
             <a:endParaRPr lang="en-US"/>
           </a:p>
@@ -2808,7 +2808,7 @@
           <a:p>
             <a:fld id="{3C9584D4-1EC3-4110-8184-CD57BE378914}" type="datetimeFigureOut">
               <a:rPr lang="en-US" smtClean="0"/>
-              <a:t>9/6/16</a:t>
+              <a:t>12/7/16</a:t>
             </a:fld>
             <a:endParaRPr lang="en-US"/>
           </a:p>
@@ -3021,7 +3021,7 @@
           <a:p>
             <a:fld id="{3C9584D4-1EC3-4110-8184-CD57BE378914}" type="datetimeFigureOut">
               <a:rPr lang="en-US" smtClean="0"/>
-              <a:t>9/6/16</a:t>
+              <a:t>12/7/16</a:t>
             </a:fld>
             <a:endParaRPr lang="en-US"/>
           </a:p>
@@ -3571,55 +3571,12 @@
           <a:prstGeom prst="triangle">
             <a:avLst/>
           </a:prstGeom>
-          <a:ln>
-            <a:solidFill>
-              <a:srgbClr val="008000"/>
-            </a:solidFill>
-            <a:miter lim="800000"/>
-          </a:ln>
-        </p:spPr>
-        <p:style>
-          <a:lnRef idx="2">
-            <a:schemeClr val="dk1"/>
-          </a:lnRef>
-          <a:fillRef idx="1">
-            <a:schemeClr val="lt1"/>
-          </a:fillRef>
-          <a:effectRef idx="0">
-            <a:schemeClr val="dk1"/>
-          </a:effectRef>
-          <a:fontRef idx="minor">
-            <a:schemeClr val="dk1"/>
-          </a:fontRef>
-        </p:style>
-        <p:txBody>
-          <a:bodyPr rot="0" spcFirstLastPara="0" vertOverflow="overflow" horzOverflow="overflow" vert="horz" wrap="square" lIns="167240" tIns="83620" rIns="167240" bIns="83620" numCol="1" spcCol="0" rtlCol="0" fromWordArt="0" anchor="ctr" anchorCtr="0" forceAA="0" compatLnSpc="1">
-            <a:prstTxWarp prst="textNoShape">
-              <a:avLst/>
-            </a:prstTxWarp>
-            <a:noAutofit/>
-          </a:bodyPr>
-          <a:lstStyle/>
-          <a:p>
-            <a:pPr algn="ctr"/>
-            <a:endParaRPr lang="en-US" sz="3292" b="1"/>
-          </a:p>
-        </p:txBody>
-      </p:sp>
-      <p:sp>
-        <p:nvSpPr>
-          <p:cNvPr id="25" name="Oval 24"/>
-          <p:cNvSpPr/>
-          <p:nvPr/>
-        </p:nvSpPr>
-        <p:spPr>
-          <a:xfrm>
-            <a:off x="3082474" y="6285503"/>
-            <a:ext cx="130990" cy="124530"/>
-          </a:xfrm>
-          <a:prstGeom prst="ellipse">
-            <a:avLst/>
-          </a:prstGeom>
+          <a:solidFill>
+            <a:schemeClr val="accent6">
+              <a:lumMod val="20000"/>
+              <a:lumOff val="80000"/>
+            </a:schemeClr>
+          </a:solidFill>
           <a:ln>
             <a:solidFill>
               <a:srgbClr val="008000"/>
@@ -3912,6 +3869,12 @@
           <a:prstGeom prst="triangle">
             <a:avLst/>
           </a:prstGeom>
+          <a:solidFill>
+            <a:schemeClr val="accent6">
+              <a:lumMod val="20000"/>
+              <a:lumOff val="80000"/>
+            </a:schemeClr>
+          </a:solidFill>
           <a:ln>
             <a:solidFill>
               <a:srgbClr val="008000"/>
@@ -3955,6 +3918,12 @@
           <a:prstGeom prst="triangle">
             <a:avLst/>
           </a:prstGeom>
+          <a:solidFill>
+            <a:schemeClr val="accent6">
+              <a:lumMod val="20000"/>
+              <a:lumOff val="80000"/>
+            </a:schemeClr>
+          </a:solidFill>
           <a:ln>
             <a:solidFill>
               <a:srgbClr val="008000"/>
@@ -3992,7 +3961,7 @@
         </p:nvSpPr>
         <p:spPr>
           <a:xfrm>
-            <a:off x="1964267" y="6116936"/>
+            <a:off x="1938867" y="6116936"/>
             <a:ext cx="1083733" cy="461665"/>
           </a:xfrm>
           <a:prstGeom prst="rect">
@@ -4007,11 +3976,25 @@
           <a:lstStyle/>
           <a:p>
             <a:r>
+              <a:rPr lang="en-US" sz="2400" i="1" dirty="0" smtClean="0">
+                <a:latin typeface="Times"/>
+                <a:cs typeface="Times"/>
+              </a:rPr>
+              <a:t>n </a:t>
+            </a:r>
+            <a:r>
               <a:rPr lang="en-US" sz="2400" dirty="0" smtClean="0">
                 <a:latin typeface="Times"/>
                 <a:cs typeface="Times"/>
               </a:rPr>
-              <a:t>n= 8 </a:t>
+              <a:t>= </a:t>
+            </a:r>
+            <a:r>
+              <a:rPr lang="en-US" sz="2400" dirty="0" smtClean="0">
+                <a:latin typeface="Times"/>
+                <a:cs typeface="Times"/>
+              </a:rPr>
+              <a:t>8 </a:t>
             </a:r>
             <a:endParaRPr lang="en-US" sz="2400" dirty="0">
               <a:latin typeface="Times"/>
@@ -4028,8 +4011,8 @@
         </p:nvSpPr>
         <p:spPr>
           <a:xfrm>
-            <a:off x="3318937" y="6116936"/>
-            <a:ext cx="1083733" cy="461665"/>
+            <a:off x="3200401" y="6116936"/>
+            <a:ext cx="1214970" cy="461665"/>
           </a:xfrm>
           <a:prstGeom prst="rect">
             <a:avLst/>
@@ -4043,11 +4026,25 @@
           <a:lstStyle/>
           <a:p>
             <a:r>
+              <a:rPr lang="en-US" sz="2400" i="1" dirty="0" smtClean="0">
+                <a:latin typeface="Times"/>
+                <a:cs typeface="Times"/>
+              </a:rPr>
+              <a:t>n </a:t>
+            </a:r>
+            <a:r>
               <a:rPr lang="en-US" sz="2400" dirty="0" smtClean="0">
                 <a:latin typeface="Times"/>
                 <a:cs typeface="Times"/>
               </a:rPr>
-              <a:t>n= 46 </a:t>
+              <a:t>= </a:t>
+            </a:r>
+            <a:r>
+              <a:rPr lang="en-US" sz="2400" dirty="0" smtClean="0">
+                <a:latin typeface="Times"/>
+                <a:cs typeface="Times"/>
+              </a:rPr>
+              <a:t>46 </a:t>
             </a:r>
             <a:endParaRPr lang="en-US" sz="2400" dirty="0">
               <a:latin typeface="Times"/>
@@ -4065,7 +4062,7 @@
         <p:spPr>
           <a:xfrm>
             <a:off x="5249340" y="6116936"/>
-            <a:ext cx="1083733" cy="461665"/>
+            <a:ext cx="1303860" cy="461665"/>
           </a:xfrm>
           <a:prstGeom prst="rect">
             <a:avLst/>
@@ -4079,11 +4076,11 @@
           <a:lstStyle/>
           <a:p>
             <a:r>
-              <a:rPr lang="en-US" sz="2400" dirty="0" smtClean="0">
+              <a:rPr lang="en-US" sz="2400" i="1" dirty="0" smtClean="0">
                 <a:latin typeface="Times"/>
                 <a:cs typeface="Times"/>
               </a:rPr>
-              <a:t>n</a:t>
+              <a:t>n </a:t>
             </a:r>
             <a:r>
               <a:rPr lang="en-US" sz="2400" dirty="0" smtClean="0"/>
@@ -4112,8 +4109,8 @@
         </p:nvSpPr>
         <p:spPr>
           <a:xfrm>
-            <a:off x="7857073" y="6116936"/>
-            <a:ext cx="1083733" cy="461665"/>
+            <a:off x="7806273" y="6116936"/>
+            <a:ext cx="1159927" cy="461665"/>
           </a:xfrm>
           <a:prstGeom prst="rect">
             <a:avLst/>
@@ -4127,11 +4124,25 @@
           <a:lstStyle/>
           <a:p>
             <a:r>
+              <a:rPr lang="en-US" sz="2400" i="1" dirty="0" smtClean="0">
+                <a:latin typeface="Times"/>
+                <a:cs typeface="Times"/>
+              </a:rPr>
+              <a:t>n</a:t>
+            </a:r>
+            <a:r>
               <a:rPr lang="en-US" sz="2400" dirty="0" smtClean="0">
                 <a:latin typeface="Times"/>
                 <a:cs typeface="Times"/>
               </a:rPr>
-              <a:t>n= 377 </a:t>
+              <a:t> = </a:t>
+            </a:r>
+            <a:r>
+              <a:rPr lang="en-US" sz="2400" dirty="0" smtClean="0">
+                <a:latin typeface="Times"/>
+                <a:cs typeface="Times"/>
+              </a:rPr>
+              <a:t>377 </a:t>
             </a:r>
             <a:endParaRPr lang="en-US" sz="2400" dirty="0">
               <a:latin typeface="Times"/>
@@ -4149,7 +4160,7 @@
         <p:spPr>
           <a:xfrm>
             <a:off x="9364143" y="6116936"/>
-            <a:ext cx="1083733" cy="461665"/>
+            <a:ext cx="1227657" cy="461665"/>
           </a:xfrm>
           <a:prstGeom prst="rect">
             <a:avLst/>
@@ -4163,11 +4174,25 @@
           <a:lstStyle/>
           <a:p>
             <a:r>
+              <a:rPr lang="en-US" sz="2400" i="1" dirty="0" smtClean="0">
+                <a:latin typeface="Times"/>
+                <a:cs typeface="Times"/>
+              </a:rPr>
+              <a:t>n </a:t>
+            </a:r>
+            <a:r>
               <a:rPr lang="en-US" sz="2400" dirty="0" smtClean="0">
                 <a:latin typeface="Times"/>
                 <a:cs typeface="Times"/>
               </a:rPr>
-              <a:t>n= 862 </a:t>
+              <a:t>= </a:t>
+            </a:r>
+            <a:r>
+              <a:rPr lang="en-US" sz="2400" dirty="0" smtClean="0">
+                <a:latin typeface="Times"/>
+                <a:cs typeface="Times"/>
+              </a:rPr>
+              <a:t>862 </a:t>
             </a:r>
             <a:endParaRPr lang="en-US" sz="2400" dirty="0">
               <a:latin typeface="Times"/>
@@ -4428,6 +4453,420 @@
                 <a:schemeClr val="tx1"/>
               </a:solidFill>
             </a:endParaRPr>
+          </a:p>
+        </p:txBody>
+      </p:sp>
+      <p:sp>
+        <p:nvSpPr>
+          <p:cNvPr id="40" name="Isosceles Triangle 39"/>
+          <p:cNvSpPr/>
+          <p:nvPr/>
+        </p:nvSpPr>
+        <p:spPr>
+          <a:xfrm>
+            <a:off x="9915291" y="575012"/>
+            <a:ext cx="187036" cy="191713"/>
+          </a:xfrm>
+          <a:prstGeom prst="triangle">
+            <a:avLst/>
+          </a:prstGeom>
+          <a:solidFill>
+            <a:schemeClr val="accent6">
+              <a:lumMod val="20000"/>
+              <a:lumOff val="80000"/>
+            </a:schemeClr>
+          </a:solidFill>
+          <a:ln>
+            <a:solidFill>
+              <a:srgbClr val="008000"/>
+            </a:solidFill>
+          </a:ln>
+        </p:spPr>
+        <p:style>
+          <a:lnRef idx="2">
+            <a:schemeClr val="accent6"/>
+          </a:lnRef>
+          <a:fillRef idx="1">
+            <a:schemeClr val="lt1"/>
+          </a:fillRef>
+          <a:effectRef idx="0">
+            <a:schemeClr val="accent6"/>
+          </a:effectRef>
+          <a:fontRef idx="minor">
+            <a:schemeClr val="dk1"/>
+          </a:fontRef>
+        </p:style>
+        <p:txBody>
+          <a:bodyPr rtlCol="0" anchor="ctr"/>
+          <a:lstStyle/>
+          <a:p>
+            <a:pPr algn="ctr"/>
+            <a:endParaRPr lang="en-US">
+              <a:solidFill>
+                <a:schemeClr val="accent6">
+                  <a:lumMod val="20000"/>
+                  <a:lumOff val="80000"/>
+                </a:schemeClr>
+              </a:solidFill>
+            </a:endParaRPr>
+          </a:p>
+        </p:txBody>
+      </p:sp>
+      <p:sp>
+        <p:nvSpPr>
+          <p:cNvPr id="41" name="Isosceles Triangle 40"/>
+          <p:cNvSpPr/>
+          <p:nvPr/>
+        </p:nvSpPr>
+        <p:spPr>
+          <a:xfrm rot="10800000">
+            <a:off x="5441618" y="3076911"/>
+            <a:ext cx="215683" cy="191713"/>
+          </a:xfrm>
+          <a:prstGeom prst="triangle">
+            <a:avLst/>
+          </a:prstGeom>
+          <a:solidFill>
+            <a:schemeClr val="accent6">
+              <a:lumMod val="20000"/>
+              <a:lumOff val="80000"/>
+            </a:schemeClr>
+          </a:solidFill>
+          <a:ln>
+            <a:solidFill>
+              <a:srgbClr val="008000"/>
+            </a:solidFill>
+          </a:ln>
+        </p:spPr>
+        <p:style>
+          <a:lnRef idx="2">
+            <a:schemeClr val="accent6"/>
+          </a:lnRef>
+          <a:fillRef idx="1">
+            <a:schemeClr val="lt1"/>
+          </a:fillRef>
+          <a:effectRef idx="0">
+            <a:schemeClr val="accent6"/>
+          </a:effectRef>
+          <a:fontRef idx="minor">
+            <a:schemeClr val="dk1"/>
+          </a:fontRef>
+        </p:style>
+        <p:txBody>
+          <a:bodyPr rtlCol="0" anchor="ctr"/>
+          <a:lstStyle/>
+          <a:p>
+            <a:pPr algn="ctr"/>
+            <a:endParaRPr lang="en-US">
+              <a:solidFill>
+                <a:schemeClr val="accent6">
+                  <a:lumMod val="60000"/>
+                  <a:lumOff val="40000"/>
+                </a:schemeClr>
+              </a:solidFill>
+            </a:endParaRPr>
+          </a:p>
+        </p:txBody>
+      </p:sp>
+      <p:sp>
+        <p:nvSpPr>
+          <p:cNvPr id="42" name="Isosceles Triangle 41"/>
+          <p:cNvSpPr/>
+          <p:nvPr/>
+        </p:nvSpPr>
+        <p:spPr>
+          <a:xfrm rot="5400000">
+            <a:off x="3168787" y="3638052"/>
+            <a:ext cx="222009" cy="187034"/>
+          </a:xfrm>
+          <a:prstGeom prst="triangle">
+            <a:avLst/>
+          </a:prstGeom>
+          <a:solidFill>
+            <a:schemeClr val="accent6">
+              <a:lumMod val="20000"/>
+              <a:lumOff val="80000"/>
+            </a:schemeClr>
+          </a:solidFill>
+          <a:ln>
+            <a:solidFill>
+              <a:srgbClr val="008000"/>
+            </a:solidFill>
+            <a:miter lim="800000"/>
+          </a:ln>
+        </p:spPr>
+        <p:style>
+          <a:lnRef idx="2">
+            <a:schemeClr val="dk1"/>
+          </a:lnRef>
+          <a:fillRef idx="1">
+            <a:schemeClr val="lt1"/>
+          </a:fillRef>
+          <a:effectRef idx="0">
+            <a:schemeClr val="dk1"/>
+          </a:effectRef>
+          <a:fontRef idx="minor">
+            <a:schemeClr val="dk1"/>
+          </a:fontRef>
+        </p:style>
+        <p:txBody>
+          <a:bodyPr rot="0" spcFirstLastPara="0" vertOverflow="overflow" horzOverflow="overflow" vert="horz" wrap="square" lIns="167240" tIns="83620" rIns="167240" bIns="83620" numCol="1" spcCol="0" rtlCol="0" fromWordArt="0" anchor="ctr" anchorCtr="0" forceAA="0" compatLnSpc="1">
+            <a:prstTxWarp prst="textNoShape">
+              <a:avLst/>
+            </a:prstTxWarp>
+            <a:noAutofit/>
+          </a:bodyPr>
+          <a:lstStyle/>
+          <a:p>
+            <a:pPr algn="ctr"/>
+            <a:endParaRPr lang="en-US" sz="3292" b="1">
+              <a:solidFill>
+                <a:schemeClr val="accent6">
+                  <a:lumMod val="60000"/>
+                  <a:lumOff val="40000"/>
+                </a:schemeClr>
+              </a:solidFill>
+            </a:endParaRPr>
+          </a:p>
+        </p:txBody>
+      </p:sp>
+      <p:sp>
+        <p:nvSpPr>
+          <p:cNvPr id="44" name="Oval 43"/>
+          <p:cNvSpPr/>
+          <p:nvPr/>
+        </p:nvSpPr>
+        <p:spPr>
+          <a:xfrm>
+            <a:off x="2284423" y="3684956"/>
+            <a:ext cx="174498" cy="165892"/>
+          </a:xfrm>
+          <a:prstGeom prst="ellipse">
+            <a:avLst/>
+          </a:prstGeom>
+          <a:solidFill>
+            <a:schemeClr val="accent6">
+              <a:lumMod val="20000"/>
+              <a:lumOff val="80000"/>
+            </a:schemeClr>
+          </a:solidFill>
+          <a:ln>
+            <a:solidFill>
+              <a:srgbClr val="008000"/>
+            </a:solidFill>
+            <a:miter lim="800000"/>
+          </a:ln>
+        </p:spPr>
+        <p:style>
+          <a:lnRef idx="2">
+            <a:schemeClr val="dk1"/>
+          </a:lnRef>
+          <a:fillRef idx="1">
+            <a:schemeClr val="lt1"/>
+          </a:fillRef>
+          <a:effectRef idx="0">
+            <a:schemeClr val="dk1"/>
+          </a:effectRef>
+          <a:fontRef idx="minor">
+            <a:schemeClr val="dk1"/>
+          </a:fontRef>
+        </p:style>
+        <p:txBody>
+          <a:bodyPr rot="0" spcFirstLastPara="0" vertOverflow="overflow" horzOverflow="overflow" vert="horz" wrap="square" lIns="167240" tIns="83620" rIns="167240" bIns="83620" numCol="1" spcCol="0" rtlCol="0" fromWordArt="0" anchor="ctr" anchorCtr="0" forceAA="0" compatLnSpc="1">
+            <a:prstTxWarp prst="textNoShape">
+              <a:avLst/>
+            </a:prstTxWarp>
+            <a:noAutofit/>
+          </a:bodyPr>
+          <a:lstStyle/>
+          <a:p>
+            <a:pPr algn="ctr"/>
+            <a:endParaRPr lang="en-US" sz="3292" b="1">
+              <a:solidFill>
+                <a:schemeClr val="accent6">
+                  <a:lumMod val="60000"/>
+                  <a:lumOff val="40000"/>
+                </a:schemeClr>
+              </a:solidFill>
+            </a:endParaRPr>
+          </a:p>
+        </p:txBody>
+      </p:sp>
+      <p:sp>
+        <p:nvSpPr>
+          <p:cNvPr id="45" name="Oval 44"/>
+          <p:cNvSpPr/>
+          <p:nvPr/>
+        </p:nvSpPr>
+        <p:spPr>
+          <a:xfrm>
+            <a:off x="3043146" y="6264822"/>
+            <a:ext cx="174498" cy="165892"/>
+          </a:xfrm>
+          <a:prstGeom prst="ellipse">
+            <a:avLst/>
+          </a:prstGeom>
+          <a:solidFill>
+            <a:schemeClr val="accent6">
+              <a:lumMod val="20000"/>
+              <a:lumOff val="80000"/>
+            </a:schemeClr>
+          </a:solidFill>
+          <a:ln>
+            <a:solidFill>
+              <a:srgbClr val="008000"/>
+            </a:solidFill>
+            <a:miter lim="800000"/>
+          </a:ln>
+        </p:spPr>
+        <p:style>
+          <a:lnRef idx="2">
+            <a:schemeClr val="dk1"/>
+          </a:lnRef>
+          <a:fillRef idx="1">
+            <a:schemeClr val="lt1"/>
+          </a:fillRef>
+          <a:effectRef idx="0">
+            <a:schemeClr val="dk1"/>
+          </a:effectRef>
+          <a:fontRef idx="minor">
+            <a:schemeClr val="dk1"/>
+          </a:fontRef>
+        </p:style>
+        <p:txBody>
+          <a:bodyPr rot="0" spcFirstLastPara="0" vertOverflow="overflow" horzOverflow="overflow" vert="horz" wrap="square" lIns="167240" tIns="83620" rIns="167240" bIns="83620" numCol="1" spcCol="0" rtlCol="0" fromWordArt="0" anchor="ctr" anchorCtr="0" forceAA="0" compatLnSpc="1">
+            <a:prstTxWarp prst="textNoShape">
+              <a:avLst/>
+            </a:prstTxWarp>
+            <a:noAutofit/>
+          </a:bodyPr>
+          <a:lstStyle/>
+          <a:p>
+            <a:pPr algn="ctr"/>
+            <a:endParaRPr lang="en-US" sz="3292" b="1"/>
+          </a:p>
+        </p:txBody>
+      </p:sp>
+      <p:sp>
+        <p:nvSpPr>
+          <p:cNvPr id="46" name="Diamond 45"/>
+          <p:cNvSpPr/>
+          <p:nvPr/>
+        </p:nvSpPr>
+        <p:spPr>
+          <a:xfrm>
+            <a:off x="2035315" y="3661616"/>
+            <a:ext cx="209717" cy="205619"/>
+          </a:xfrm>
+          <a:prstGeom prst="diamond">
+            <a:avLst/>
+          </a:prstGeom>
+          <a:solidFill>
+            <a:schemeClr val="accent6">
+              <a:lumMod val="20000"/>
+              <a:lumOff val="80000"/>
+            </a:schemeClr>
+          </a:solidFill>
+          <a:ln>
+            <a:solidFill>
+              <a:srgbClr val="008000"/>
+            </a:solidFill>
+            <a:miter lim="800000"/>
+          </a:ln>
+        </p:spPr>
+        <p:style>
+          <a:lnRef idx="2">
+            <a:schemeClr val="dk1"/>
+          </a:lnRef>
+          <a:fillRef idx="1">
+            <a:schemeClr val="lt1"/>
+          </a:fillRef>
+          <a:effectRef idx="0">
+            <a:schemeClr val="dk1"/>
+          </a:effectRef>
+          <a:fontRef idx="minor">
+            <a:schemeClr val="dk1"/>
+          </a:fontRef>
+        </p:style>
+        <p:txBody>
+          <a:bodyPr rot="0" spcFirstLastPara="0" vertOverflow="overflow" horzOverflow="overflow" vert="horz" wrap="square" lIns="167240" tIns="83620" rIns="167240" bIns="83620" numCol="1" spcCol="0" rtlCol="0" fromWordArt="0" anchor="ctr" anchorCtr="0" forceAA="0" compatLnSpc="1">
+            <a:prstTxWarp prst="textNoShape">
+              <a:avLst/>
+            </a:prstTxWarp>
+            <a:noAutofit/>
+          </a:bodyPr>
+          <a:lstStyle/>
+          <a:p>
+            <a:pPr algn="ctr"/>
+            <a:r>
+              <a:rPr lang="en-US" sz="3292" b="1" dirty="0">
+                <a:solidFill>
+                  <a:schemeClr val="accent6">
+                    <a:lumMod val="60000"/>
+                    <a:lumOff val="40000"/>
+                  </a:schemeClr>
+                </a:solidFill>
+              </a:rPr>
+              <a:t> </a:t>
+            </a:r>
+          </a:p>
+        </p:txBody>
+      </p:sp>
+      <p:sp>
+        <p:nvSpPr>
+          <p:cNvPr id="47" name="Diamond 46"/>
+          <p:cNvSpPr/>
+          <p:nvPr/>
+        </p:nvSpPr>
+        <p:spPr>
+          <a:xfrm>
+            <a:off x="1753457" y="6244959"/>
+            <a:ext cx="209717" cy="205619"/>
+          </a:xfrm>
+          <a:prstGeom prst="diamond">
+            <a:avLst/>
+          </a:prstGeom>
+          <a:solidFill>
+            <a:schemeClr val="accent6">
+              <a:lumMod val="20000"/>
+              <a:lumOff val="80000"/>
+            </a:schemeClr>
+          </a:solidFill>
+          <a:ln>
+            <a:solidFill>
+              <a:srgbClr val="008000"/>
+            </a:solidFill>
+            <a:miter lim="800000"/>
+          </a:ln>
+        </p:spPr>
+        <p:style>
+          <a:lnRef idx="2">
+            <a:schemeClr val="dk1"/>
+          </a:lnRef>
+          <a:fillRef idx="1">
+            <a:schemeClr val="lt1"/>
+          </a:fillRef>
+          <a:effectRef idx="0">
+            <a:schemeClr val="dk1"/>
+          </a:effectRef>
+          <a:fontRef idx="minor">
+            <a:schemeClr val="dk1"/>
+          </a:fontRef>
+        </p:style>
+        <p:txBody>
+          <a:bodyPr rot="0" spcFirstLastPara="0" vertOverflow="overflow" horzOverflow="overflow" vert="horz" wrap="square" lIns="167240" tIns="83620" rIns="167240" bIns="83620" numCol="1" spcCol="0" rtlCol="0" fromWordArt="0" anchor="ctr" anchorCtr="0" forceAA="0" compatLnSpc="1">
+            <a:prstTxWarp prst="textNoShape">
+              <a:avLst/>
+            </a:prstTxWarp>
+            <a:noAutofit/>
+          </a:bodyPr>
+          <a:lstStyle/>
+          <a:p>
+            <a:pPr algn="ctr"/>
+            <a:r>
+              <a:rPr lang="en-US" sz="3292" b="1" dirty="0"/>
+              <a:t> </a:t>
+            </a:r>
           </a:p>
         </p:txBody>
       </p:sp>
@@ -4706,7 +5145,7 @@
   <a:extraClrSchemeLst/>
   <a:extLst>
     <a:ext uri="{05A4C25C-085E-4340-85A3-A5531E510DB2}">
-      <thm15:themeFamily xmlns="" xmlns:thm15="http://schemas.microsoft.com/office/thememl/2012/main" name="Office Theme" id="{62F939B6-93AF-4DB8-9C6B-D6C7DFDC589F}" vid="{4A3C46E8-61CC-4603-A589-7422A47A8E4A}"/>
+      <thm15:themeFamily xmlns:thm15="http://schemas.microsoft.com/office/thememl/2012/main" xmlns="" name="Office Theme" id="{62F939B6-93AF-4DB8-9C6B-D6C7DFDC589F}" vid="{4A3C46E8-61CC-4603-A589-7422A47A8E4A}"/>
     </a:ext>
   </a:extLst>
 </a:theme>
@@ -4967,7 +5406,7 @@
   <a:extraClrSchemeLst/>
   <a:extLst>
     <a:ext uri="{05A4C25C-085E-4340-85A3-A5531E510DB2}">
-      <thm15:themeFamily xmlns="" xmlns:thm15="http://schemas.microsoft.com/office/thememl/2012/main" name="Office Theme" id="{62F939B6-93AF-4DB8-9C6B-D6C7DFDC589F}" vid="{4A3C46E8-61CC-4603-A589-7422A47A8E4A}"/>
+      <thm15:themeFamily xmlns:thm15="http://schemas.microsoft.com/office/thememl/2012/main" xmlns="" name="Office Theme" id="{62F939B6-93AF-4DB8-9C6B-D6C7DFDC589F}" vid="{4A3C46E8-61CC-4603-A589-7422A47A8E4A}"/>
     </a:ext>
   </a:extLst>
 </a:theme>

</xml_diff>